<commit_message>
Change the presentation from italian to english version
</commit_message>
<xml_diff>
--- a/PlayList musicale - presentation.pptx
+++ b/PlayList musicale - presentation.pptx
@@ -120,7 +120,49 @@
       </a:defRPr>
     </a:lvl9pPr>
   </p:defaultTextStyle>
+  <p:extLst>
+    <p:ext uri="{EFAFB233-063F-42B5-8137-9DF3F51BA10A}">
+      <p15:sldGuideLst xmlns:p15="http://schemas.microsoft.com/office/powerpoint/2012/main"/>
+    </p:ext>
+  </p:extLst>
 </p:presentation>
+</file>
+
+<file path=ppt/revisionInfo.xml><?xml version="1.0" encoding="utf-8"?>
+<p1510:revInfo xmlns:a="http://schemas.openxmlformats.org/drawingml/2006/main" xmlns:r="http://schemas.openxmlformats.org/officeDocument/2006/relationships" xmlns:p1510="http://schemas.microsoft.com/office/powerpoint/2015/10/main">
+  <p1510:revLst>
+    <p1510:client id="{F15716D0-BAC1-4FB6-BF05-176D3BAA63A1}" v="19" dt="2021-06-07T16:00:18.797"/>
+  </p1510:revLst>
+</p1510:revInfo>
+</file>
+
+<file path=ppt/changesInfos/changesInfo1.xml><?xml version="1.0" encoding="utf-8"?>
+<pc:chgInfo xmlns:a="http://schemas.openxmlformats.org/drawingml/2006/main" xmlns:r="http://schemas.openxmlformats.org/officeDocument/2006/relationships" xmlns:ac="http://schemas.microsoft.com/office/drawing/2013/main/command" xmlns:pc="http://schemas.microsoft.com/office/powerpoint/2013/main/command">
+  <pc:docChgLst>
+    <pc:chgData name="matteo nunziante" userId="7f0da054e76bb5fa" providerId="LiveId" clId="{F15716D0-BAC1-4FB6-BF05-176D3BAA63A1}"/>
+    <pc:docChg chg="modSld">
+      <pc:chgData name="matteo nunziante" userId="7f0da054e76bb5fa" providerId="LiveId" clId="{F15716D0-BAC1-4FB6-BF05-176D3BAA63A1}" dt="2021-06-07T16:01:05.582" v="443" actId="207"/>
+      <pc:docMkLst>
+        <pc:docMk/>
+      </pc:docMkLst>
+      <pc:sldChg chg="modSp mod">
+        <pc:chgData name="matteo nunziante" userId="7f0da054e76bb5fa" providerId="LiveId" clId="{F15716D0-BAC1-4FB6-BF05-176D3BAA63A1}" dt="2021-06-07T16:01:05.582" v="443" actId="207"/>
+        <pc:sldMkLst>
+          <pc:docMk/>
+          <pc:sldMk cId="4293414970" sldId="259"/>
+        </pc:sldMkLst>
+        <pc:spChg chg="mod">
+          <ac:chgData name="matteo nunziante" userId="7f0da054e76bb5fa" providerId="LiveId" clId="{F15716D0-BAC1-4FB6-BF05-176D3BAA63A1}" dt="2021-06-07T16:01:05.582" v="443" actId="207"/>
+          <ac:spMkLst>
+            <pc:docMk/>
+            <pc:sldMk cId="4293414970" sldId="259"/>
+            <ac:spMk id="3" creationId="{D4F9415C-9E9C-48B4-A8B4-DECB55769D79}"/>
+          </ac:spMkLst>
+        </pc:spChg>
+      </pc:sldChg>
+    </pc:docChg>
+  </pc:docChgLst>
+</pc:chgInfo>
 </file>
 
 <file path=ppt/slideLayouts/slideLayout1.xml><?xml version="1.0" encoding="utf-8"?>
@@ -5581,16 +5623,6 @@
           <a:p>
             <a:pPr algn="ctr"/>
             <a:r>
-              <a:rPr lang="it-IT" sz="4000" b="1" dirty="0" err="1">
-                <a:solidFill>
-                  <a:schemeClr val="accent1">
-                    <a:lumMod val="75000"/>
-                  </a:schemeClr>
-                </a:solidFill>
-              </a:rPr>
-              <a:t>Sequence</a:t>
-            </a:r>
-            <a:r>
               <a:rPr lang="it-IT" sz="4000" b="1" dirty="0">
                 <a:solidFill>
                   <a:schemeClr val="accent1">
@@ -5598,67 +5630,64 @@
                   </a:schemeClr>
                 </a:solidFill>
               </a:rPr>
-              <a:t> </a:t>
-            </a:r>
-            <a:r>
-              <a:rPr lang="it-IT" sz="4000" b="1" dirty="0" err="1">
+              <a:t>Sequence diagrams</a:t>
+            </a:r>
+          </a:p>
+        </p:txBody>
+      </p:sp>
+      <p:sp>
+        <p:nvSpPr>
+          <p:cNvPr id="3" name="Segnaposto contenuto 2">
+            <a:extLst>
+              <a:ext uri="{FF2B5EF4-FFF2-40B4-BE49-F238E27FC236}">
+                <a16:creationId xmlns:a16="http://schemas.microsoft.com/office/drawing/2014/main" id="{D4F9415C-9E9C-48B4-A8B4-DECB55769D79}"/>
+              </a:ext>
+            </a:extLst>
+          </p:cNvPr>
+          <p:cNvSpPr>
+            <a:spLocks noGrp="1"/>
+          </p:cNvSpPr>
+          <p:nvPr>
+            <p:ph idx="1"/>
+          </p:nvPr>
+        </p:nvSpPr>
+        <p:spPr/>
+        <p:txBody>
+          <a:bodyPr/>
+          <a:lstStyle/>
+          <a:p>
+            <a:pPr marL="0" indent="0">
+              <a:buNone/>
+            </a:pPr>
+            <a:r>
+              <a:rPr lang="it-IT" dirty="0">
                 <a:solidFill>
                   <a:schemeClr val="accent1">
                     <a:lumMod val="75000"/>
                   </a:schemeClr>
                 </a:solidFill>
               </a:rPr>
-              <a:t>diagrams</a:t>
-            </a:r>
-            <a:endParaRPr lang="it-IT" sz="4000" b="1" dirty="0">
-              <a:solidFill>
-                <a:schemeClr val="accent1">
-                  <a:lumMod val="75000"/>
-                </a:schemeClr>
-              </a:solidFill>
-            </a:endParaRPr>
-          </a:p>
-        </p:txBody>
-      </p:sp>
-      <p:sp>
-        <p:nvSpPr>
-          <p:cNvPr id="3" name="Segnaposto contenuto 2">
-            <a:extLst>
-              <a:ext uri="{FF2B5EF4-FFF2-40B4-BE49-F238E27FC236}">
-                <a16:creationId xmlns:a16="http://schemas.microsoft.com/office/drawing/2014/main" id="{D4F9415C-9E9C-48B4-A8B4-DECB55769D79}"/>
-              </a:ext>
-            </a:extLst>
-          </p:cNvPr>
-          <p:cNvSpPr>
-            <a:spLocks noGrp="1"/>
-          </p:cNvSpPr>
-          <p:nvPr>
-            <p:ph idx="1"/>
-          </p:nvPr>
-        </p:nvSpPr>
-        <p:spPr/>
-        <p:txBody>
-          <a:bodyPr/>
-          <a:lstStyle/>
-          <a:p>
-            <a:pPr marL="0" indent="0">
-              <a:buNone/>
-            </a:pPr>
+              <a:t>Simplifications done:</a:t>
+            </a:r>
+          </a:p>
+          <a:p>
             <a:r>
               <a:rPr lang="it-IT" dirty="0"/>
-              <a:t>Semplificazioni fatte:</a:t>
-            </a:r>
-          </a:p>
-          <a:p>
+              <a:t>Parameter controls and the menagement of the relative </a:t>
+            </a:r>
+            <a:r>
+              <a:rPr lang="en-GB" dirty="0"/>
+              <a:t>errors</a:t>
+            </a:r>
             <a:r>
               <a:rPr lang="it-IT" dirty="0"/>
-              <a:t>Non sono stati riportati i controlli sui parametri in ingresso e la gestione di eventuali errori sugli stessi;</a:t>
+              <a:t> are not been inserted in the diagrams;</a:t>
             </a:r>
           </a:p>
           <a:p>
             <a:r>
               <a:rPr lang="it-IT" dirty="0"/>
-              <a:t>Ogni qual volta viene istanziato un oggetto DAO questo riceve come parametro la connessione al DB.</a:t>
+              <a:t>Everytime there is an instanciation of a DAO object, this receives a connection to the DB as parameter.</a:t>
             </a:r>
           </a:p>
         </p:txBody>

</xml_diff>

<commit_message>
Added a method in PlaylistDAO
</commit_message>
<xml_diff>
--- a/PlayList musicale - presentation.pptx
+++ b/PlayList musicale - presentation.pptx
@@ -131,7 +131,7 @@
 <file path=ppt/revisionInfo.xml><?xml version="1.0" encoding="utf-8"?>
 <p1510:revInfo xmlns:a="http://schemas.openxmlformats.org/drawingml/2006/main" xmlns:r="http://schemas.openxmlformats.org/officeDocument/2006/relationships" xmlns:p1510="http://schemas.microsoft.com/office/powerpoint/2015/10/main">
   <p1510:revLst>
-    <p1510:client id="{F15716D0-BAC1-4FB6-BF05-176D3BAA63A1}" v="19" dt="2021-06-07T16:00:18.797"/>
+    <p1510:client id="{F15716D0-BAC1-4FB6-BF05-176D3BAA63A1}" v="21" dt="2021-06-08T09:59:30.138"/>
   </p1510:revLst>
 </p1510:revInfo>
 </file>
@@ -140,11 +140,34 @@
 <pc:chgInfo xmlns:a="http://schemas.openxmlformats.org/drawingml/2006/main" xmlns:r="http://schemas.openxmlformats.org/officeDocument/2006/relationships" xmlns:ac="http://schemas.microsoft.com/office/drawing/2013/main/command" xmlns:pc="http://schemas.microsoft.com/office/powerpoint/2013/main/command">
   <pc:docChgLst>
     <pc:chgData name="matteo nunziante" userId="7f0da054e76bb5fa" providerId="LiveId" clId="{F15716D0-BAC1-4FB6-BF05-176D3BAA63A1}"/>
-    <pc:docChg chg="modSld">
-      <pc:chgData name="matteo nunziante" userId="7f0da054e76bb5fa" providerId="LiveId" clId="{F15716D0-BAC1-4FB6-BF05-176D3BAA63A1}" dt="2021-06-07T16:01:05.582" v="443" actId="207"/>
+    <pc:docChg chg="custSel modSld">
+      <pc:chgData name="matteo nunziante" userId="7f0da054e76bb5fa" providerId="LiveId" clId="{F15716D0-BAC1-4FB6-BF05-176D3BAA63A1}" dt="2021-06-08T09:57:53.793" v="487" actId="20577"/>
       <pc:docMkLst>
         <pc:docMk/>
       </pc:docMkLst>
+      <pc:sldChg chg="modSp mod">
+        <pc:chgData name="matteo nunziante" userId="7f0da054e76bb5fa" providerId="LiveId" clId="{F15716D0-BAC1-4FB6-BF05-176D3BAA63A1}" dt="2021-06-08T09:57:53.793" v="487" actId="20577"/>
+        <pc:sldMkLst>
+          <pc:docMk/>
+          <pc:sldMk cId="1119765260" sldId="258"/>
+        </pc:sldMkLst>
+        <pc:spChg chg="mod">
+          <ac:chgData name="matteo nunziante" userId="7f0da054e76bb5fa" providerId="LiveId" clId="{F15716D0-BAC1-4FB6-BF05-176D3BAA63A1}" dt="2021-06-08T09:57:53.793" v="487" actId="20577"/>
+          <ac:spMkLst>
+            <pc:docMk/>
+            <pc:sldMk cId="1119765260" sldId="258"/>
+            <ac:spMk id="3" creationId="{1EF1ADE0-3806-4186-A7B5-9895B21CCABC}"/>
+          </ac:spMkLst>
+        </pc:spChg>
+        <pc:spChg chg="mod">
+          <ac:chgData name="matteo nunziante" userId="7f0da054e76bb5fa" providerId="LiveId" clId="{F15716D0-BAC1-4FB6-BF05-176D3BAA63A1}" dt="2021-06-08T09:57:33.896" v="445" actId="27636"/>
+          <ac:spMkLst>
+            <pc:docMk/>
+            <pc:sldMk cId="1119765260" sldId="258"/>
+            <ac:spMk id="4" creationId="{83201C16-28B8-4889-A469-C9F1F9835A9A}"/>
+          </ac:spMkLst>
+        </pc:spChg>
+      </pc:sldChg>
       <pc:sldChg chg="modSp mod">
         <pc:chgData name="matteo nunziante" userId="7f0da054e76bb5fa" providerId="LiveId" clId="{F15716D0-BAC1-4FB6-BF05-176D3BAA63A1}" dt="2021-06-07T16:01:05.582" v="443" actId="207"/>
         <pc:sldMkLst>
@@ -312,7 +335,7 @@
           <a:p>
             <a:fld id="{E8599015-8B6E-45EB-8D1C-800E116D7968}" type="datetimeFigureOut">
               <a:rPr lang="it-IT" smtClean="0"/>
-              <a:t>07/06/2021</a:t>
+              <a:t>08/06/2021</a:t>
             </a:fld>
             <a:endParaRPr lang="it-IT"/>
           </a:p>
@@ -510,7 +533,7 @@
           <a:p>
             <a:fld id="{E8599015-8B6E-45EB-8D1C-800E116D7968}" type="datetimeFigureOut">
               <a:rPr lang="it-IT" smtClean="0"/>
-              <a:t>07/06/2021</a:t>
+              <a:t>08/06/2021</a:t>
             </a:fld>
             <a:endParaRPr lang="it-IT"/>
           </a:p>
@@ -718,7 +741,7 @@
           <a:p>
             <a:fld id="{E8599015-8B6E-45EB-8D1C-800E116D7968}" type="datetimeFigureOut">
               <a:rPr lang="it-IT" smtClean="0"/>
-              <a:t>07/06/2021</a:t>
+              <a:t>08/06/2021</a:t>
             </a:fld>
             <a:endParaRPr lang="it-IT"/>
           </a:p>
@@ -916,7 +939,7 @@
           <a:p>
             <a:fld id="{E8599015-8B6E-45EB-8D1C-800E116D7968}" type="datetimeFigureOut">
               <a:rPr lang="it-IT" smtClean="0"/>
-              <a:t>07/06/2021</a:t>
+              <a:t>08/06/2021</a:t>
             </a:fld>
             <a:endParaRPr lang="it-IT"/>
           </a:p>
@@ -1191,7 +1214,7 @@
           <a:p>
             <a:fld id="{E8599015-8B6E-45EB-8D1C-800E116D7968}" type="datetimeFigureOut">
               <a:rPr lang="it-IT" smtClean="0"/>
-              <a:t>07/06/2021</a:t>
+              <a:t>08/06/2021</a:t>
             </a:fld>
             <a:endParaRPr lang="it-IT"/>
           </a:p>
@@ -1456,7 +1479,7 @@
           <a:p>
             <a:fld id="{E8599015-8B6E-45EB-8D1C-800E116D7968}" type="datetimeFigureOut">
               <a:rPr lang="it-IT" smtClean="0"/>
-              <a:t>07/06/2021</a:t>
+              <a:t>08/06/2021</a:t>
             </a:fld>
             <a:endParaRPr lang="it-IT"/>
           </a:p>
@@ -1868,7 +1891,7 @@
           <a:p>
             <a:fld id="{E8599015-8B6E-45EB-8D1C-800E116D7968}" type="datetimeFigureOut">
               <a:rPr lang="it-IT" smtClean="0"/>
-              <a:t>07/06/2021</a:t>
+              <a:t>08/06/2021</a:t>
             </a:fld>
             <a:endParaRPr lang="it-IT"/>
           </a:p>
@@ -2009,7 +2032,7 @@
           <a:p>
             <a:fld id="{E8599015-8B6E-45EB-8D1C-800E116D7968}" type="datetimeFigureOut">
               <a:rPr lang="it-IT" smtClean="0"/>
-              <a:t>07/06/2021</a:t>
+              <a:t>08/06/2021</a:t>
             </a:fld>
             <a:endParaRPr lang="it-IT"/>
           </a:p>
@@ -2122,7 +2145,7 @@
           <a:p>
             <a:fld id="{E8599015-8B6E-45EB-8D1C-800E116D7968}" type="datetimeFigureOut">
               <a:rPr lang="it-IT" smtClean="0"/>
-              <a:t>07/06/2021</a:t>
+              <a:t>08/06/2021</a:t>
             </a:fld>
             <a:endParaRPr lang="it-IT"/>
           </a:p>
@@ -2433,7 +2456,7 @@
           <a:p>
             <a:fld id="{E8599015-8B6E-45EB-8D1C-800E116D7968}" type="datetimeFigureOut">
               <a:rPr lang="it-IT" smtClean="0"/>
-              <a:t>07/06/2021</a:t>
+              <a:t>08/06/2021</a:t>
             </a:fld>
             <a:endParaRPr lang="it-IT"/>
           </a:p>
@@ -2721,7 +2744,7 @@
           <a:p>
             <a:fld id="{E8599015-8B6E-45EB-8D1C-800E116D7968}" type="datetimeFigureOut">
               <a:rPr lang="it-IT" smtClean="0"/>
-              <a:t>07/06/2021</a:t>
+              <a:t>08/06/2021</a:t>
             </a:fld>
             <a:endParaRPr lang="it-IT"/>
           </a:p>
@@ -2962,7 +2985,7 @@
           <a:p>
             <a:fld id="{E8599015-8B6E-45EB-8D1C-800E116D7968}" type="datetimeFigureOut">
               <a:rPr lang="it-IT" smtClean="0"/>
-              <a:t>07/06/2021</a:t>
+              <a:t>08/06/2021</a:t>
             </a:fld>
             <a:endParaRPr lang="it-IT"/>
           </a:p>
@@ -3888,45 +3911,8 @@
                   </a:schemeClr>
                 </a:solidFill>
               </a:rPr>
-              <a:t>Event: </a:t>
-            </a:r>
-            <a:r>
-              <a:rPr lang="it-IT" sz="4000" b="1" dirty="0" err="1">
-                <a:solidFill>
-                  <a:schemeClr val="accent1">
-                    <a:lumMod val="75000"/>
-                  </a:schemeClr>
-                </a:solidFill>
-              </a:rPr>
-              <a:t>add</a:t>
-            </a:r>
-            <a:r>
-              <a:rPr lang="it-IT" sz="4000" b="1" dirty="0">
-                <a:solidFill>
-                  <a:schemeClr val="accent1">
-                    <a:lumMod val="75000"/>
-                  </a:schemeClr>
-                </a:solidFill>
-              </a:rPr>
-              <a:t> </a:t>
-            </a:r>
-            <a:r>
-              <a:rPr lang="it-IT" sz="4000" b="1" dirty="0" err="1">
-                <a:solidFill>
-                  <a:schemeClr val="accent1">
-                    <a:lumMod val="75000"/>
-                  </a:schemeClr>
-                </a:solidFill>
-              </a:rPr>
-              <a:t>songs</a:t>
-            </a:r>
-            <a:endParaRPr lang="it-IT" sz="4000" b="1" dirty="0">
-              <a:solidFill>
-                <a:schemeClr val="accent1">
-                  <a:lumMod val="75000"/>
-                </a:schemeClr>
-              </a:solidFill>
-            </a:endParaRPr>
+              <a:t>Event: add songs</a:t>
+            </a:r>
           </a:p>
         </p:txBody>
       </p:sp>
@@ -4306,25 +4292,8 @@
                   </a:schemeClr>
                 </a:solidFill>
               </a:rPr>
-              <a:t> </a:t>
-            </a:r>
-            <a:r>
-              <a:rPr lang="it-IT" sz="4000" b="1" dirty="0" err="1">
-                <a:solidFill>
-                  <a:schemeClr val="accent1">
-                    <a:lumMod val="75000"/>
-                  </a:schemeClr>
-                </a:solidFill>
-              </a:rPr>
-              <a:t>songs</a:t>
-            </a:r>
-            <a:endParaRPr lang="it-IT" sz="4000" b="1" dirty="0">
-              <a:solidFill>
-                <a:schemeClr val="accent1">
-                  <a:lumMod val="75000"/>
-                </a:schemeClr>
-              </a:solidFill>
-            </a:endParaRPr>
+              <a:t> songs</a:t>
+            </a:r>
           </a:p>
         </p:txBody>
       </p:sp>
@@ -5031,7 +5000,7 @@
         </p:spPr>
         <p:txBody>
           <a:bodyPr>
-            <a:normAutofit fontScale="55000" lnSpcReduction="20000"/>
+            <a:normAutofit fontScale="47500" lnSpcReduction="20000"/>
           </a:bodyPr>
           <a:lstStyle/>
           <a:p>
@@ -5211,6 +5180,16 @@
             </a:r>
           </a:p>
           <a:p>
+            <a:pPr lvl="2">
+              <a:buFont typeface="Wingdings" panose="05000000000000000000" pitchFamily="2" charset="2"/>
+              <a:buChar char="q"/>
+            </a:pPr>
+            <a:r>
+              <a:rPr lang="es-419" dirty="0"/>
+              <a:t>findSongInPlaylist(playlistId , songId)</a:t>
+            </a:r>
+          </a:p>
+          <a:p>
             <a:pPr lvl="1">
               <a:buFont typeface="Courier New" panose="02070309020205020404" pitchFamily="49" charset="0"/>
               <a:buChar char="o"/>
@@ -5368,7 +5347,7 @@
         </p:spPr>
         <p:txBody>
           <a:bodyPr>
-            <a:normAutofit fontScale="55000" lnSpcReduction="20000"/>
+            <a:normAutofit fontScale="47500" lnSpcReduction="20000"/>
           </a:bodyPr>
           <a:lstStyle/>
           <a:p>

</xml_diff>